<commit_message>
Added Hands On Assignmants - Day 7
</commit_message>
<xml_diff>
--- a/5. Spring Data REST/Day 7/Slides/4. Customizing REST Payloads/customizing-rest-payloads-slides.pptx
+++ b/5. Spring Data REST/Day 7/Slides/4. Customizing REST Payloads/customizing-rest-payloads-slides.pptx
@@ -2911,8 +2911,8 @@
         </p:nvSpPr>
         <p:spPr>
           <a:xfrm>
-            <a:off x="10947473" y="2057392"/>
-            <a:ext cx="4095115" cy="421640"/>
+            <a:off x="10947400" y="1984375"/>
+            <a:ext cx="5090795" cy="412750"/>
           </a:xfrm>
           <a:prstGeom prst="rect">
             <a:avLst/>
@@ -2933,9 +2933,9 @@
               </a:spcBef>
             </a:pPr>
             <a:r>
-              <a:rPr sz="2600" spc="45" dirty="0">
-                <a:solidFill>
-                  <a:srgbClr val="FF0000"/>
+              <a:rPr sz="2600" b="1" spc="45" dirty="0">
+                <a:solidFill>
+                  <a:schemeClr val="bg1"/>
                 </a:solidFill>
                 <a:latin typeface="Verdana" panose="020B0604030504040204"/>
                 <a:cs typeface="Verdana" panose="020B0604030504040204"/>
@@ -2943,19 +2943,19 @@
               <a:t>model</a:t>
             </a:r>
             <a:r>
-              <a:rPr sz="2600" spc="-145" dirty="0">
-                <a:solidFill>
-                  <a:srgbClr val="FF0000"/>
-                </a:solidFill>
-                <a:latin typeface="Verdana" panose="020B0604030504040204"/>
-                <a:cs typeface="Verdana" panose="020B0604030504040204"/>
-              </a:rPr>
-              <a:t> </a:t>
-            </a:r>
-            <a:r>
-              <a:rPr sz="2600" spc="45" dirty="0">
-                <a:solidFill>
-                  <a:srgbClr val="FF0000"/>
+              <a:rPr sz="2600" b="1" spc="-145" dirty="0">
+                <a:solidFill>
+                  <a:schemeClr val="bg1"/>
+                </a:solidFill>
+                <a:latin typeface="Verdana" panose="020B0604030504040204"/>
+                <a:cs typeface="Verdana" panose="020B0604030504040204"/>
+              </a:rPr>
+              <a:t> </a:t>
+            </a:r>
+            <a:r>
+              <a:rPr sz="2600" b="1" spc="45" dirty="0">
+                <a:solidFill>
+                  <a:schemeClr val="bg1"/>
                 </a:solidFill>
                 <a:latin typeface="Verdana" panose="020B0604030504040204"/>
                 <a:cs typeface="Verdana" panose="020B0604030504040204"/>
@@ -2963,19 +2963,19 @@
               <a:t>or</a:t>
             </a:r>
             <a:r>
-              <a:rPr sz="2600" spc="-145" dirty="0">
-                <a:solidFill>
-                  <a:srgbClr val="FF0000"/>
-                </a:solidFill>
-                <a:latin typeface="Verdana" panose="020B0604030504040204"/>
-                <a:cs typeface="Verdana" panose="020B0604030504040204"/>
-              </a:rPr>
-              <a:t> </a:t>
-            </a:r>
-            <a:r>
-              <a:rPr sz="2600" spc="15" dirty="0">
-                <a:solidFill>
-                  <a:srgbClr val="FF0000"/>
+              <a:rPr sz="2600" b="1" spc="-145" dirty="0">
+                <a:solidFill>
+                  <a:schemeClr val="bg1"/>
+                </a:solidFill>
+                <a:latin typeface="Verdana" panose="020B0604030504040204"/>
+                <a:cs typeface="Verdana" panose="020B0604030504040204"/>
+              </a:rPr>
+              <a:t> </a:t>
+            </a:r>
+            <a:r>
+              <a:rPr sz="2600" b="1" spc="15" dirty="0">
+                <a:solidFill>
+                  <a:schemeClr val="bg1"/>
                 </a:solidFill>
                 <a:latin typeface="Verdana" panose="020B0604030504040204"/>
                 <a:cs typeface="Verdana" panose="020B0604030504040204"/>
@@ -2983,28 +2983,38 @@
               <a:t>entity</a:t>
             </a:r>
             <a:r>
-              <a:rPr sz="2600" spc="-145" dirty="0">
-                <a:solidFill>
-                  <a:srgbClr val="FF0000"/>
-                </a:solidFill>
-                <a:latin typeface="Verdana" panose="020B0604030504040204"/>
-                <a:cs typeface="Verdana" panose="020B0604030504040204"/>
-              </a:rPr>
-              <a:t> </a:t>
-            </a:r>
-            <a:r>
-              <a:rPr sz="2600" spc="35" dirty="0">
-                <a:solidFill>
-                  <a:srgbClr val="FF0000"/>
-                </a:solidFill>
-                <a:latin typeface="Verdana" panose="020B0604030504040204"/>
-                <a:cs typeface="Verdana" panose="020B0604030504040204"/>
-              </a:rPr>
-              <a:t>package</a:t>
-            </a:r>
-            <a:endParaRPr sz="2600" spc="35" dirty="0">
+              <a:rPr sz="2600" b="1" spc="-145" dirty="0">
+                <a:solidFill>
+                  <a:schemeClr val="bg1"/>
+                </a:solidFill>
+                <a:latin typeface="Verdana" panose="020B0604030504040204"/>
+                <a:cs typeface="Verdana" panose="020B0604030504040204"/>
+              </a:rPr>
+              <a:t> </a:t>
+            </a:r>
+            <a:r>
+              <a:rPr sz="2600" b="1" spc="35" dirty="0">
+                <a:solidFill>
+                  <a:schemeClr val="bg1"/>
+                </a:solidFill>
+                <a:latin typeface="Verdana" panose="020B0604030504040204"/>
+                <a:cs typeface="Verdana" panose="020B0604030504040204"/>
+              </a:rPr>
+              <a:t>pa</a:t>
+            </a:r>
+            <a:r>
+              <a:rPr sz="2600" b="1" spc="35" dirty="0">
+                <a:solidFill>
+                  <a:schemeClr val="bg1"/>
+                </a:solidFill>
+                <a:latin typeface="Verdana" panose="020B0604030504040204"/>
+                <a:cs typeface="Verdana" panose="020B0604030504040204"/>
+              </a:rPr>
+              <a:t>ckage</a:t>
+            </a:r>
+            <a:endParaRPr sz="2600" b="1" spc="35" dirty="0">
               <a:solidFill>
-                <a:srgbClr val="FF0000"/>
+                <a:schemeClr val="bg1"/>
               </a:solidFill>
               <a:latin typeface="Verdana" panose="020B0604030504040204"/>
               <a:cs typeface="Verdana" panose="020B0604030504040204"/>

</xml_diff>